<commit_message>
added protopy implementation and examples
</commit_message>
<xml_diff>
--- a/RESTfulAppEngine.pptx
+++ b/RESTfulAppEngine.pptx
@@ -10,12 +10,13 @@
     <p:sldId id="260" r:id="rId4"/>
     <p:sldId id="261" r:id="rId5"/>
     <p:sldId id="262" r:id="rId6"/>
-    <p:sldId id="263" r:id="rId7"/>
-    <p:sldId id="264" r:id="rId8"/>
-    <p:sldId id="265" r:id="rId9"/>
-    <p:sldId id="266" r:id="rId10"/>
-    <p:sldId id="258" r:id="rId11"/>
-    <p:sldId id="259" r:id="rId12"/>
+    <p:sldId id="267" r:id="rId7"/>
+    <p:sldId id="263" r:id="rId8"/>
+    <p:sldId id="264" r:id="rId9"/>
+    <p:sldId id="265" r:id="rId10"/>
+    <p:sldId id="266" r:id="rId11"/>
+    <p:sldId id="258" r:id="rId12"/>
+    <p:sldId id="259" r:id="rId13"/>
   </p:sldIdLst>
   <p:sldSz cx="9144000" cy="6858000" type="screen4x3"/>
   <p:notesSz cx="6858000" cy="9144000"/>
@@ -298,7 +299,7 @@
           <a:p>
             <a:fld id="{83E48C2D-6812-EF46-BE52-139A15B4B66F}" type="datetimeFigureOut">
               <a:rPr lang="en-US" smtClean="0"/>
-              <a:t>3/16/15</a:t>
+              <a:t>3/17/15</a:t>
             </a:fld>
             <a:endParaRPr lang="en-US"/>
           </a:p>
@@ -468,7 +469,7 @@
           <a:p>
             <a:fld id="{83E48C2D-6812-EF46-BE52-139A15B4B66F}" type="datetimeFigureOut">
               <a:rPr lang="en-US" smtClean="0"/>
-              <a:t>3/16/15</a:t>
+              <a:t>3/17/15</a:t>
             </a:fld>
             <a:endParaRPr lang="en-US"/>
           </a:p>
@@ -648,7 +649,7 @@
           <a:p>
             <a:fld id="{83E48C2D-6812-EF46-BE52-139A15B4B66F}" type="datetimeFigureOut">
               <a:rPr lang="en-US" smtClean="0"/>
-              <a:t>3/16/15</a:t>
+              <a:t>3/17/15</a:t>
             </a:fld>
             <a:endParaRPr lang="en-US"/>
           </a:p>
@@ -818,7 +819,7 @@
           <a:p>
             <a:fld id="{83E48C2D-6812-EF46-BE52-139A15B4B66F}" type="datetimeFigureOut">
               <a:rPr lang="en-US" smtClean="0"/>
-              <a:t>3/16/15</a:t>
+              <a:t>3/17/15</a:t>
             </a:fld>
             <a:endParaRPr lang="en-US"/>
           </a:p>
@@ -1064,7 +1065,7 @@
           <a:p>
             <a:fld id="{83E48C2D-6812-EF46-BE52-139A15B4B66F}" type="datetimeFigureOut">
               <a:rPr lang="en-US" smtClean="0"/>
-              <a:t>3/16/15</a:t>
+              <a:t>3/17/15</a:t>
             </a:fld>
             <a:endParaRPr lang="en-US"/>
           </a:p>
@@ -1352,7 +1353,7 @@
           <a:p>
             <a:fld id="{83E48C2D-6812-EF46-BE52-139A15B4B66F}" type="datetimeFigureOut">
               <a:rPr lang="en-US" smtClean="0"/>
-              <a:t>3/16/15</a:t>
+              <a:t>3/17/15</a:t>
             </a:fld>
             <a:endParaRPr lang="en-US"/>
           </a:p>
@@ -1774,7 +1775,7 @@
           <a:p>
             <a:fld id="{83E48C2D-6812-EF46-BE52-139A15B4B66F}" type="datetimeFigureOut">
               <a:rPr lang="en-US" smtClean="0"/>
-              <a:t>3/16/15</a:t>
+              <a:t>3/17/15</a:t>
             </a:fld>
             <a:endParaRPr lang="en-US"/>
           </a:p>
@@ -1892,7 +1893,7 @@
           <a:p>
             <a:fld id="{83E48C2D-6812-EF46-BE52-139A15B4B66F}" type="datetimeFigureOut">
               <a:rPr lang="en-US" smtClean="0"/>
-              <a:t>3/16/15</a:t>
+              <a:t>3/17/15</a:t>
             </a:fld>
             <a:endParaRPr lang="en-US"/>
           </a:p>
@@ -1987,7 +1988,7 @@
           <a:p>
             <a:fld id="{83E48C2D-6812-EF46-BE52-139A15B4B66F}" type="datetimeFigureOut">
               <a:rPr lang="en-US" smtClean="0"/>
-              <a:t>3/16/15</a:t>
+              <a:t>3/17/15</a:t>
             </a:fld>
             <a:endParaRPr lang="en-US"/>
           </a:p>
@@ -2264,7 +2265,7 @@
           <a:p>
             <a:fld id="{83E48C2D-6812-EF46-BE52-139A15B4B66F}" type="datetimeFigureOut">
               <a:rPr lang="en-US" smtClean="0"/>
-              <a:t>3/16/15</a:t>
+              <a:t>3/17/15</a:t>
             </a:fld>
             <a:endParaRPr lang="en-US"/>
           </a:p>
@@ -2517,7 +2518,7 @@
           <a:p>
             <a:fld id="{83E48C2D-6812-EF46-BE52-139A15B4B66F}" type="datetimeFigureOut">
               <a:rPr lang="en-US" smtClean="0"/>
-              <a:t>3/16/15</a:t>
+              <a:t>3/17/15</a:t>
             </a:fld>
             <a:endParaRPr lang="en-US"/>
           </a:p>
@@ -2730,7 +2731,7 @@
           <a:p>
             <a:fld id="{83E48C2D-6812-EF46-BE52-139A15B4B66F}" type="datetimeFigureOut">
               <a:rPr lang="en-US" smtClean="0"/>
-              <a:t>3/16/15</a:t>
+              <a:t>3/17/15</a:t>
             </a:fld>
             <a:endParaRPr lang="en-US"/>
           </a:p>
@@ -3197,6 +3198,377 @@
       </p:grpSpPr>
       <p:sp>
         <p:nvSpPr>
+          <p:cNvPr id="2" name="Title 1"/>
+          <p:cNvSpPr>
+            <a:spLocks noGrp="1"/>
+          </p:cNvSpPr>
+          <p:nvPr>
+            <p:ph type="title"/>
+          </p:nvPr>
+        </p:nvSpPr>
+        <p:spPr/>
+        <p:txBody>
+          <a:bodyPr/>
+          <a:lstStyle/>
+          <a:p>
+            <a:r>
+              <a:rPr lang="en-US" dirty="0" smtClean="0"/>
+              <a:t>Player: Entity </a:t>
+            </a:r>
+            <a:r>
+              <a:rPr lang="en-US" dirty="0" smtClean="0">
+                <a:latin typeface="Wingdings"/>
+                <a:ea typeface="Wingdings"/>
+                <a:cs typeface="Wingdings"/>
+                <a:sym typeface="Wingdings"/>
+              </a:rPr>
+              <a:t></a:t>
+            </a:r>
+            <a:r>
+              <a:rPr lang="en-US" dirty="0" err="1" smtClean="0"/>
+              <a:t>Dict</a:t>
+            </a:r>
+            <a:r>
+              <a:rPr lang="en-US" dirty="0" smtClean="0"/>
+              <a:t> </a:t>
+            </a:r>
+            <a:r>
+              <a:rPr lang="en-US" dirty="0" smtClean="0">
+                <a:latin typeface="Wingdings"/>
+                <a:ea typeface="Wingdings"/>
+                <a:cs typeface="Wingdings"/>
+                <a:sym typeface="Wingdings"/>
+              </a:rPr>
+              <a:t></a:t>
+            </a:r>
+            <a:r>
+              <a:rPr lang="en-US" dirty="0" smtClean="0"/>
+              <a:t>JSON </a:t>
+            </a:r>
+            <a:endParaRPr lang="en-US" dirty="0"/>
+          </a:p>
+        </p:txBody>
+      </p:sp>
+      <p:sp>
+        <p:nvSpPr>
+          <p:cNvPr id="3" name="Content Placeholder 2"/>
+          <p:cNvSpPr>
+            <a:spLocks noGrp="1"/>
+          </p:cNvSpPr>
+          <p:nvPr>
+            <p:ph idx="1"/>
+          </p:nvPr>
+        </p:nvSpPr>
+        <p:spPr/>
+        <p:txBody>
+          <a:bodyPr>
+            <a:normAutofit fontScale="85000" lnSpcReduction="20000"/>
+          </a:bodyPr>
+          <a:lstStyle/>
+          <a:p>
+            <a:pPr marL="0" indent="0">
+              <a:buNone/>
+            </a:pPr>
+            <a:r>
+              <a:rPr lang="en-US" b="1" dirty="0" err="1"/>
+              <a:t>def</a:t>
+            </a:r>
+            <a:r>
+              <a:rPr lang="en-US" b="1" dirty="0"/>
+              <a:t> </a:t>
+            </a:r>
+            <a:r>
+              <a:rPr lang="en-US" dirty="0" err="1"/>
+              <a:t>player_to_dict</a:t>
+            </a:r>
+            <a:r>
+              <a:rPr lang="en-US" dirty="0"/>
+              <a:t>(player):</a:t>
+            </a:r>
+            <a:br>
+              <a:rPr lang="en-US" dirty="0"/>
+            </a:br>
+            <a:r>
+              <a:rPr lang="en-US" dirty="0"/>
+              <a:t>    </a:t>
+            </a:r>
+            <a:r>
+              <a:rPr lang="en-US" b="1" dirty="0"/>
+              <a:t>return </a:t>
+            </a:r>
+            <a:r>
+              <a:rPr lang="en-US" dirty="0"/>
+              <a:t>{</a:t>
+            </a:r>
+            <a:br>
+              <a:rPr lang="en-US" dirty="0"/>
+            </a:br>
+            <a:r>
+              <a:rPr lang="en-US" dirty="0"/>
+              <a:t>        </a:t>
+            </a:r>
+            <a:r>
+              <a:rPr lang="en-US" b="1" dirty="0"/>
+              <a:t>'id'</a:t>
+            </a:r>
+            <a:r>
+              <a:rPr lang="en-US" dirty="0"/>
+              <a:t>: </a:t>
+            </a:r>
+            <a:r>
+              <a:rPr lang="en-US" dirty="0" err="1"/>
+              <a:t>player.key.id</a:t>
+            </a:r>
+            <a:r>
+              <a:rPr lang="en-US" dirty="0"/>
+              <a:t>() </a:t>
+            </a:r>
+            <a:r>
+              <a:rPr lang="en-US" b="1" dirty="0"/>
+              <a:t>if </a:t>
+            </a:r>
+            <a:r>
+              <a:rPr lang="en-US" dirty="0" err="1"/>
+              <a:t>player.key</a:t>
+            </a:r>
+            <a:r>
+              <a:rPr lang="en-US" dirty="0"/>
+              <a:t> </a:t>
+            </a:r>
+            <a:r>
+              <a:rPr lang="en-US" b="1" dirty="0"/>
+              <a:t>else </a:t>
+            </a:r>
+            <a:r>
+              <a:rPr lang="en-US" dirty="0"/>
+              <a:t>None,</a:t>
+            </a:r>
+            <a:br>
+              <a:rPr lang="en-US" dirty="0"/>
+            </a:br>
+            <a:r>
+              <a:rPr lang="en-US" dirty="0"/>
+              <a:t>        </a:t>
+            </a:r>
+            <a:r>
+              <a:rPr lang="en-US" b="1" dirty="0"/>
+              <a:t>'name'</a:t>
+            </a:r>
+            <a:r>
+              <a:rPr lang="en-US" dirty="0"/>
+              <a:t>: </a:t>
+            </a:r>
+            <a:r>
+              <a:rPr lang="en-US" dirty="0" err="1"/>
+              <a:t>player.name</a:t>
+            </a:r>
+            <a:r>
+              <a:rPr lang="en-US" dirty="0"/>
+              <a:t>,</a:t>
+            </a:r>
+            <a:br>
+              <a:rPr lang="en-US" dirty="0"/>
+            </a:br>
+            <a:r>
+              <a:rPr lang="en-US" dirty="0"/>
+              <a:t>        </a:t>
+            </a:r>
+            <a:r>
+              <a:rPr lang="en-US" b="1" dirty="0"/>
+              <a:t>'position'</a:t>
+            </a:r>
+            <a:r>
+              <a:rPr lang="en-US" dirty="0"/>
+              <a:t>: </a:t>
+            </a:r>
+            <a:r>
+              <a:rPr lang="en-US" dirty="0" err="1"/>
+              <a:t>player.position</a:t>
+            </a:r>
+            <a:r>
+              <a:rPr lang="en-US" dirty="0"/>
+              <a:t>,</a:t>
+            </a:r>
+            <a:br>
+              <a:rPr lang="en-US" dirty="0"/>
+            </a:br>
+            <a:r>
+              <a:rPr lang="en-US" dirty="0"/>
+              <a:t>        </a:t>
+            </a:r>
+            <a:r>
+              <a:rPr lang="en-US" b="1" dirty="0"/>
+              <a:t>'</a:t>
+            </a:r>
+            <a:r>
+              <a:rPr lang="en-US" b="1" dirty="0" err="1"/>
+              <a:t>team_id</a:t>
+            </a:r>
+            <a:r>
+              <a:rPr lang="en-US" b="1" dirty="0"/>
+              <a:t>'</a:t>
+            </a:r>
+            <a:r>
+              <a:rPr lang="en-US" dirty="0"/>
+              <a:t>: </a:t>
+            </a:r>
+            <a:r>
+              <a:rPr lang="en-US" dirty="0" err="1"/>
+              <a:t>player.team.id</a:t>
+            </a:r>
+            <a:r>
+              <a:rPr lang="en-US" dirty="0"/>
+              <a:t>() </a:t>
+            </a:r>
+            <a:r>
+              <a:rPr lang="en-US" b="1" dirty="0"/>
+              <a:t>if </a:t>
+            </a:r>
+            <a:r>
+              <a:rPr lang="en-US" dirty="0" err="1"/>
+              <a:t>player.team</a:t>
+            </a:r>
+            <a:r>
+              <a:rPr lang="en-US" dirty="0"/>
+              <a:t> </a:t>
+            </a:r>
+            <a:r>
+              <a:rPr lang="en-US" b="1" dirty="0"/>
+              <a:t>else </a:t>
+            </a:r>
+            <a:r>
+              <a:rPr lang="en-US" dirty="0"/>
+              <a:t>None</a:t>
+            </a:r>
+            <a:br>
+              <a:rPr lang="en-US" dirty="0"/>
+            </a:br>
+            <a:r>
+              <a:rPr lang="en-US" dirty="0"/>
+              <a:t>    </a:t>
+            </a:r>
+            <a:r>
+              <a:rPr lang="en-US" dirty="0" smtClean="0"/>
+              <a:t>}</a:t>
+            </a:r>
+          </a:p>
+          <a:p>
+            <a:pPr marL="0" indent="0">
+              <a:buNone/>
+            </a:pPr>
+            <a:r>
+              <a:rPr lang="en-US" dirty="0"/>
+              <a:t># </a:t>
+            </a:r>
+            <a:r>
+              <a:rPr lang="en-US" dirty="0" err="1"/>
+              <a:t>json.dumps</a:t>
+            </a:r>
+            <a:r>
+              <a:rPr lang="en-US" dirty="0"/>
+              <a:t>(</a:t>
+            </a:r>
+            <a:r>
+              <a:rPr lang="en-US" dirty="0" err="1"/>
+              <a:t>main.player_to_dict</a:t>
+            </a:r>
+            <a:r>
+              <a:rPr lang="en-US" dirty="0"/>
+              <a:t>(</a:t>
+            </a:r>
+            <a:r>
+              <a:rPr lang="en-US" dirty="0" err="1"/>
+              <a:t>main.Player</a:t>
+            </a:r>
+            <a:r>
+              <a:rPr lang="en-US" dirty="0"/>
+              <a:t>(name=</a:t>
+            </a:r>
+            <a:r>
+              <a:rPr lang="en-US" b="1" dirty="0"/>
+              <a:t>"Kyle Rau"</a:t>
+            </a:r>
+            <a:r>
+              <a:rPr lang="en-US" dirty="0"/>
+              <a:t>, position=</a:t>
+            </a:r>
+            <a:r>
+              <a:rPr lang="en-US" b="1" dirty="0"/>
+              <a:t>"Forward"</a:t>
+            </a:r>
+            <a:r>
+              <a:rPr lang="en-US" dirty="0"/>
+              <a:t>, team=</a:t>
+            </a:r>
+            <a:r>
+              <a:rPr lang="en-US" dirty="0" err="1"/>
+              <a:t>t.key</a:t>
+            </a:r>
+            <a:r>
+              <a:rPr lang="en-US" dirty="0"/>
+              <a:t>))</a:t>
+            </a:r>
+            <a:r>
+              <a:rPr lang="en-US" dirty="0" smtClean="0"/>
+              <a:t>)</a:t>
+            </a:r>
+          </a:p>
+          <a:p>
+            <a:pPr marL="0" indent="0">
+              <a:buNone/>
+            </a:pPr>
+            <a:r>
+              <a:rPr lang="en-US" dirty="0" smtClean="0"/>
+              <a:t># =</a:t>
+            </a:r>
+            <a:r>
+              <a:rPr lang="en-US" dirty="0"/>
+              <a:t>&gt; {"position": "Forward", "</a:t>
+            </a:r>
+            <a:r>
+              <a:rPr lang="en-US" dirty="0" err="1"/>
+              <a:t>team_id</a:t>
+            </a:r>
+            <a:r>
+              <a:rPr lang="en-US"/>
+              <a:t>": 1, "id": null, "name": "Kyle Rau"}</a:t>
+            </a:r>
+            <a:endParaRPr lang="en-US" dirty="0"/>
+          </a:p>
+        </p:txBody>
+      </p:sp>
+    </p:spTree>
+    <p:extLst>
+      <p:ext uri="{BB962C8B-B14F-4D97-AF65-F5344CB8AC3E}">
+        <p14:creationId xmlns:p14="http://schemas.microsoft.com/office/powerpoint/2010/main" val="3077875695"/>
+      </p:ext>
+    </p:extLst>
+  </p:cSld>
+  <p:clrMapOvr>
+    <a:masterClrMapping/>
+  </p:clrMapOvr>
+</p:sld>
+</file>
+
+<file path=ppt/slides/slide11.xml><?xml version="1.0" encoding="utf-8"?>
+<p:sld xmlns:a="http://schemas.openxmlformats.org/drawingml/2006/main" xmlns:r="http://schemas.openxmlformats.org/officeDocument/2006/relationships" xmlns:p="http://schemas.openxmlformats.org/presentationml/2006/main">
+  <p:cSld>
+    <p:spTree>
+      <p:nvGrpSpPr>
+        <p:cNvPr id="1" name=""/>
+        <p:cNvGrpSpPr/>
+        <p:nvPr/>
+      </p:nvGrpSpPr>
+      <p:grpSpPr>
+        <a:xfrm>
+          <a:off x="0" y="0"/>
+          <a:ext cx="0" cy="0"/>
+          <a:chOff x="0" y="0"/>
+          <a:chExt cx="0" cy="0"/>
+        </a:xfrm>
+      </p:grpSpPr>
+      <p:sp>
+        <p:nvSpPr>
           <p:cNvPr id="4" name="Title 3"/>
           <p:cNvSpPr>
             <a:spLocks noGrp="1"/>
@@ -3250,7 +3622,7 @@
 </p:sld>
 </file>
 
-<file path=ppt/slides/slide11.xml><?xml version="1.0" encoding="utf-8"?>
+<file path=ppt/slides/slide12.xml><?xml version="1.0" encoding="utf-8"?>
 <p:sld xmlns:a="http://schemas.openxmlformats.org/drawingml/2006/main" xmlns:r="http://schemas.openxmlformats.org/officeDocument/2006/relationships" xmlns:p="http://schemas.openxmlformats.org/presentationml/2006/main">
   <p:cSld>
     <p:spTree>
@@ -3518,11 +3890,7 @@
             </a:r>
             <a:r>
               <a:rPr lang="en-US" dirty="0" smtClean="0"/>
-              <a:t> </a:t>
-            </a:r>
-            <a:r>
-              <a:rPr lang="en-US" dirty="0" smtClean="0"/>
-              <a:t>oriented</a:t>
+              <a:t> oriented</a:t>
             </a:r>
           </a:p>
           <a:p>
@@ -3906,7 +4274,7 @@
           <a:p>
             <a:r>
               <a:rPr lang="en-US" dirty="0" smtClean="0"/>
-              <a:t>Entities</a:t>
+              <a:t>Tools</a:t>
             </a:r>
             <a:endParaRPr lang="en-US" dirty="0"/>
           </a:p>
@@ -3919,91 +4287,49 @@
             <a:spLocks noGrp="1"/>
           </p:cNvSpPr>
           <p:nvPr>
-            <p:ph sz="half" idx="1"/>
-          </p:nvPr>
-        </p:nvSpPr>
-        <p:spPr/>
-        <p:txBody>
-          <a:bodyPr/>
-          <a:lstStyle/>
-          <a:p>
-            <a:pPr marL="0" indent="0">
-              <a:buNone/>
-            </a:pPr>
-            <a:r>
-              <a:rPr lang="en-US" b="1" dirty="0" smtClean="0"/>
-              <a:t>Team:</a:t>
-            </a:r>
-          </a:p>
-          <a:p>
-            <a:r>
-              <a:rPr lang="en-US" dirty="0" smtClean="0"/>
-              <a:t>Name</a:t>
-            </a:r>
-          </a:p>
-          <a:p>
-            <a:r>
-              <a:rPr lang="en-US" dirty="0" smtClean="0"/>
-              <a:t>Mascot</a:t>
-            </a:r>
-          </a:p>
-          <a:p>
-            <a:r>
-              <a:rPr lang="en-US" dirty="0" smtClean="0"/>
-              <a:t>Colors</a:t>
-            </a:r>
-            <a:endParaRPr lang="en-US" dirty="0"/>
-          </a:p>
-        </p:txBody>
-      </p:sp>
-      <p:sp>
-        <p:nvSpPr>
-          <p:cNvPr id="4" name="Content Placeholder 3"/>
-          <p:cNvSpPr>
-            <a:spLocks noGrp="1"/>
-          </p:cNvSpPr>
-          <p:nvPr>
-            <p:ph sz="half" idx="2"/>
-          </p:nvPr>
-        </p:nvSpPr>
-        <p:spPr/>
-        <p:txBody>
-          <a:bodyPr/>
-          <a:lstStyle/>
-          <a:p>
-            <a:pPr marL="0" indent="0">
-              <a:buNone/>
-            </a:pPr>
-            <a:r>
-              <a:rPr lang="en-US" b="1" dirty="0" smtClean="0"/>
-              <a:t>Player:</a:t>
-            </a:r>
-          </a:p>
-          <a:p>
-            <a:r>
-              <a:rPr lang="en-US" dirty="0" smtClean="0"/>
-              <a:t>Team</a:t>
-            </a:r>
-          </a:p>
-          <a:p>
-            <a:r>
-              <a:rPr lang="en-US" dirty="0" smtClean="0"/>
-              <a:t>Name</a:t>
-            </a:r>
-          </a:p>
-          <a:p>
-            <a:r>
-              <a:rPr lang="en-US" dirty="0" smtClean="0"/>
-              <a:t>Position</a:t>
-            </a:r>
-            <a:endParaRPr lang="en-US" dirty="0"/>
+            <p:ph idx="1"/>
+          </p:nvPr>
+        </p:nvSpPr>
+        <p:spPr/>
+        <p:txBody>
+          <a:bodyPr/>
+          <a:lstStyle/>
+          <a:p>
+            <a:r>
+              <a:rPr lang="en-US" dirty="0" smtClean="0"/>
+              <a:t>Postman REST Client</a:t>
+            </a:r>
+          </a:p>
+          <a:p>
+            <a:r>
+              <a:rPr lang="en-US" dirty="0" smtClean="0"/>
+              <a:t>Fiddler</a:t>
+            </a:r>
+          </a:p>
+          <a:p>
+            <a:r>
+              <a:rPr lang="en-US" dirty="0" err="1" smtClean="0"/>
+              <a:t>cUrl</a:t>
+            </a:r>
+            <a:endParaRPr lang="en-US" dirty="0" smtClean="0"/>
+          </a:p>
+          <a:p>
+            <a:r>
+              <a:rPr lang="en-US" dirty="0" smtClean="0"/>
+              <a:t>Python </a:t>
+            </a:r>
+            <a:r>
+              <a:rPr lang="en-US" smtClean="0"/>
+              <a:t>requests library</a:t>
+            </a:r>
+            <a:endParaRPr lang="en-US"/>
           </a:p>
         </p:txBody>
       </p:sp>
     </p:spTree>
     <p:extLst>
       <p:ext uri="{BB962C8B-B14F-4D97-AF65-F5344CB8AC3E}">
-        <p14:creationId xmlns:p14="http://schemas.microsoft.com/office/powerpoint/2010/main" val="880778453"/>
+        <p14:creationId xmlns:p14="http://schemas.microsoft.com/office/powerpoint/2010/main" val="3841259159"/>
       </p:ext>
     </p:extLst>
   </p:cSld>
@@ -4047,7 +4373,7 @@
           <a:p>
             <a:r>
               <a:rPr lang="en-US" dirty="0" smtClean="0"/>
-              <a:t>NDB Entities</a:t>
+              <a:t>Entities</a:t>
             </a:r>
             <a:endParaRPr lang="en-US" dirty="0"/>
           </a:p>
@@ -4060,206 +4386,91 @@
             <a:spLocks noGrp="1"/>
           </p:cNvSpPr>
           <p:nvPr>
-            <p:ph idx="1"/>
-          </p:nvPr>
-        </p:nvSpPr>
-        <p:spPr/>
-        <p:txBody>
-          <a:bodyPr>
-            <a:normAutofit fontScale="92500" lnSpcReduction="20000"/>
-          </a:bodyPr>
+            <p:ph sz="half" idx="1"/>
+          </p:nvPr>
+        </p:nvSpPr>
+        <p:spPr/>
+        <p:txBody>
+          <a:bodyPr/>
           <a:lstStyle/>
           <a:p>
             <a:pPr marL="0" indent="0">
               <a:buNone/>
             </a:pPr>
             <a:r>
-              <a:rPr lang="en-US" b="1" dirty="0"/>
-              <a:t>from </a:t>
-            </a:r>
-            <a:r>
-              <a:rPr lang="en-US" dirty="0" err="1"/>
-              <a:t>google.appengine.ext</a:t>
-            </a:r>
-            <a:r>
-              <a:rPr lang="en-US" dirty="0"/>
-              <a:t> </a:t>
-            </a:r>
-            <a:r>
-              <a:rPr lang="en-US" b="1" dirty="0"/>
-              <a:t>import </a:t>
-            </a:r>
-            <a:r>
-              <a:rPr lang="en-US" dirty="0" err="1" smtClean="0"/>
-              <a:t>ndb</a:t>
-            </a:r>
-            <a:endParaRPr lang="en-US" dirty="0" smtClean="0"/>
-          </a:p>
+              <a:rPr lang="en-US" b="1" dirty="0" smtClean="0"/>
+              <a:t>Team:</a:t>
+            </a:r>
+          </a:p>
+          <a:p>
+            <a:r>
+              <a:rPr lang="en-US" dirty="0" smtClean="0"/>
+              <a:t>Name</a:t>
+            </a:r>
+          </a:p>
+          <a:p>
+            <a:r>
+              <a:rPr lang="en-US" dirty="0" smtClean="0"/>
+              <a:t>Mascot</a:t>
+            </a:r>
+          </a:p>
+          <a:p>
+            <a:r>
+              <a:rPr lang="en-US" dirty="0" smtClean="0"/>
+              <a:t>Colors</a:t>
+            </a:r>
+            <a:endParaRPr lang="en-US" dirty="0"/>
+          </a:p>
+        </p:txBody>
+      </p:sp>
+      <p:sp>
+        <p:nvSpPr>
+          <p:cNvPr id="4" name="Content Placeholder 3"/>
+          <p:cNvSpPr>
+            <a:spLocks noGrp="1"/>
+          </p:cNvSpPr>
+          <p:nvPr>
+            <p:ph sz="half" idx="2"/>
+          </p:nvPr>
+        </p:nvSpPr>
+        <p:spPr/>
+        <p:txBody>
+          <a:bodyPr/>
+          <a:lstStyle/>
           <a:p>
             <a:pPr marL="0" indent="0">
               <a:buNone/>
             </a:pPr>
-            <a:endParaRPr lang="en-US" b="1" dirty="0" smtClean="0"/>
-          </a:p>
-          <a:p>
-            <a:pPr marL="0" indent="0">
-              <a:buNone/>
-            </a:pPr>
             <a:r>
               <a:rPr lang="en-US" b="1" dirty="0" smtClean="0"/>
-              <a:t>class </a:t>
-            </a:r>
-            <a:r>
-              <a:rPr lang="en-US" dirty="0"/>
-              <a:t>Team(</a:t>
-            </a:r>
-            <a:r>
-              <a:rPr lang="en-US" dirty="0" err="1"/>
-              <a:t>ndb.Model</a:t>
-            </a:r>
-            <a:r>
-              <a:rPr lang="en-US" dirty="0"/>
-              <a:t>):</a:t>
-            </a:r>
-            <a:br>
-              <a:rPr lang="en-US" dirty="0"/>
-            </a:br>
-            <a:r>
-              <a:rPr lang="en-US" dirty="0"/>
-              <a:t>    name = </a:t>
-            </a:r>
-            <a:r>
-              <a:rPr lang="en-US" dirty="0" err="1"/>
-              <a:t>ndb.StringProperty</a:t>
-            </a:r>
-            <a:r>
-              <a:rPr lang="en-US" dirty="0"/>
-              <a:t>()</a:t>
-            </a:r>
-            <a:br>
-              <a:rPr lang="en-US" dirty="0"/>
-            </a:br>
-            <a:r>
-              <a:rPr lang="en-US" dirty="0"/>
-              <a:t>    colors = </a:t>
-            </a:r>
-            <a:r>
-              <a:rPr lang="en-US" dirty="0" err="1"/>
-              <a:t>ndb.StringProperty</a:t>
-            </a:r>
-            <a:r>
-              <a:rPr lang="en-US" dirty="0"/>
-              <a:t>(</a:t>
-            </a:r>
-            <a:r>
-              <a:rPr lang="en-US" dirty="0"/>
-              <a:t>repeated</a:t>
-            </a:r>
-            <a:r>
-              <a:rPr lang="en-US" dirty="0"/>
-              <a:t>=</a:t>
-            </a:r>
-            <a:r>
-              <a:rPr lang="en-US" dirty="0"/>
-              <a:t>True</a:t>
-            </a:r>
-            <a:r>
-              <a:rPr lang="en-US" dirty="0"/>
-              <a:t>)</a:t>
-            </a:r>
-            <a:br>
-              <a:rPr lang="en-US" dirty="0"/>
-            </a:br>
-            <a:r>
-              <a:rPr lang="en-US" dirty="0"/>
-              <a:t>    mascot = </a:t>
-            </a:r>
-            <a:r>
-              <a:rPr lang="en-US" dirty="0" err="1"/>
-              <a:t>ndb.StringProperty</a:t>
-            </a:r>
-            <a:r>
-              <a:rPr lang="en-US" dirty="0"/>
-              <a:t>()</a:t>
-            </a:r>
-            <a:br>
-              <a:rPr lang="en-US" dirty="0"/>
-            </a:br>
-            <a:r>
-              <a:rPr lang="en-US" dirty="0"/>
-              <a:t/>
-            </a:r>
-            <a:br>
-              <a:rPr lang="en-US" dirty="0"/>
-            </a:br>
-            <a:r>
-              <a:rPr lang="en-US" b="1" dirty="0"/>
-              <a:t>class </a:t>
-            </a:r>
-            <a:r>
-              <a:rPr lang="en-US" dirty="0"/>
-              <a:t>Player(</a:t>
-            </a:r>
-            <a:r>
-              <a:rPr lang="en-US" dirty="0" err="1"/>
-              <a:t>ndb.Model</a:t>
-            </a:r>
-            <a:r>
-              <a:rPr lang="en-US" dirty="0"/>
-              <a:t>):</a:t>
-            </a:r>
-            <a:br>
-              <a:rPr lang="en-US" dirty="0"/>
-            </a:br>
-            <a:r>
-              <a:rPr lang="en-US" dirty="0"/>
-              <a:t>    team = </a:t>
-            </a:r>
-            <a:r>
-              <a:rPr lang="en-US" dirty="0" err="1"/>
-              <a:t>ndb.KeyProperty</a:t>
-            </a:r>
-            <a:r>
-              <a:rPr lang="en-US" dirty="0"/>
-              <a:t>()</a:t>
-            </a:r>
-            <a:br>
-              <a:rPr lang="en-US" dirty="0"/>
-            </a:br>
-            <a:r>
-              <a:rPr lang="en-US" dirty="0"/>
-              <a:t>    name = </a:t>
-            </a:r>
-            <a:r>
-              <a:rPr lang="en-US" dirty="0" err="1"/>
-              <a:t>ndb.StringProperty</a:t>
-            </a:r>
-            <a:r>
-              <a:rPr lang="en-US" dirty="0"/>
-              <a:t>()</a:t>
-            </a:r>
-            <a:br>
-              <a:rPr lang="en-US" dirty="0"/>
-            </a:br>
-            <a:r>
-              <a:rPr lang="en-US" dirty="0"/>
-              <a:t>    position = </a:t>
-            </a:r>
-            <a:r>
-              <a:rPr lang="en-US" dirty="0" err="1"/>
-              <a:t>ndb.StringProperty</a:t>
-            </a:r>
-            <a:r>
-              <a:rPr lang="en-US" dirty="0"/>
-              <a:t>()</a:t>
-            </a:r>
+              <a:t>Player:</a:t>
+            </a:r>
+          </a:p>
+          <a:p>
+            <a:r>
+              <a:rPr lang="en-US" dirty="0" smtClean="0"/>
+              <a:t>Team</a:t>
+            </a:r>
+          </a:p>
+          <a:p>
+            <a:r>
+              <a:rPr lang="en-US" dirty="0" smtClean="0"/>
+              <a:t>Name</a:t>
+            </a:r>
+          </a:p>
+          <a:p>
+            <a:r>
+              <a:rPr lang="en-US" dirty="0" smtClean="0"/>
+              <a:t>Position</a:t>
+            </a:r>
+            <a:endParaRPr lang="en-US" dirty="0"/>
           </a:p>
         </p:txBody>
       </p:sp>
     </p:spTree>
     <p:extLst>
       <p:ext uri="{BB962C8B-B14F-4D97-AF65-F5344CB8AC3E}">
-        <p14:creationId xmlns:p14="http://schemas.microsoft.com/office/powerpoint/2010/main" val="186227706"/>
+        <p14:creationId xmlns:p14="http://schemas.microsoft.com/office/powerpoint/2010/main" val="880778453"/>
       </p:ext>
     </p:extLst>
   </p:cSld>
@@ -4303,88 +4514,161 @@
           <a:p>
             <a:r>
               <a:rPr lang="en-US" dirty="0" smtClean="0"/>
-              <a:t>Team: Entity </a:t>
-            </a:r>
-            <a:r>
-              <a:rPr lang="en-US" dirty="0" smtClean="0">
-                <a:latin typeface="Wingdings"/>
-                <a:ea typeface="Wingdings"/>
-                <a:cs typeface="Wingdings"/>
-                <a:sym typeface="Wingdings"/>
-              </a:rPr>
-              <a:t></a:t>
+              <a:t>NDB Entities</a:t>
+            </a:r>
+            <a:endParaRPr lang="en-US" dirty="0"/>
+          </a:p>
+        </p:txBody>
+      </p:sp>
+      <p:sp>
+        <p:nvSpPr>
+          <p:cNvPr id="3" name="Content Placeholder 2"/>
+          <p:cNvSpPr>
+            <a:spLocks noGrp="1"/>
+          </p:cNvSpPr>
+          <p:nvPr>
+            <p:ph idx="1"/>
+          </p:nvPr>
+        </p:nvSpPr>
+        <p:spPr/>
+        <p:txBody>
+          <a:bodyPr>
+            <a:normAutofit fontScale="92500" lnSpcReduction="20000"/>
+          </a:bodyPr>
+          <a:lstStyle/>
+          <a:p>
+            <a:pPr marL="0" indent="0">
+              <a:buNone/>
+            </a:pPr>
+            <a:r>
+              <a:rPr lang="en-US" b="1" dirty="0"/>
+              <a:t>from </a:t>
+            </a:r>
+            <a:r>
+              <a:rPr lang="en-US" dirty="0" err="1"/>
+              <a:t>google.appengine.ext</a:t>
+            </a:r>
+            <a:r>
+              <a:rPr lang="en-US" dirty="0"/>
+              <a:t> </a:t>
+            </a:r>
+            <a:r>
+              <a:rPr lang="en-US" b="1" dirty="0"/>
+              <a:t>import </a:t>
             </a:r>
             <a:r>
               <a:rPr lang="en-US" dirty="0" err="1" smtClean="0"/>
-              <a:t>Dict</a:t>
-            </a:r>
-            <a:r>
-              <a:rPr lang="en-US" dirty="0" smtClean="0"/>
-              <a:t> </a:t>
-            </a:r>
-            <a:r>
-              <a:rPr lang="en-US" dirty="0" smtClean="0">
-                <a:latin typeface="Wingdings"/>
-                <a:ea typeface="Wingdings"/>
-                <a:cs typeface="Wingdings"/>
-                <a:sym typeface="Wingdings"/>
-              </a:rPr>
-              <a:t></a:t>
-            </a:r>
-            <a:r>
-              <a:rPr lang="en-US" dirty="0" smtClean="0"/>
-              <a:t>JSON </a:t>
-            </a:r>
-            <a:endParaRPr lang="en-US" dirty="0"/>
-          </a:p>
-        </p:txBody>
-      </p:sp>
-      <p:sp>
-        <p:nvSpPr>
-          <p:cNvPr id="3" name="Content Placeholder 2"/>
-          <p:cNvSpPr>
-            <a:spLocks noGrp="1"/>
-          </p:cNvSpPr>
-          <p:nvPr>
-            <p:ph idx="1"/>
-          </p:nvPr>
-        </p:nvSpPr>
-        <p:spPr/>
-        <p:txBody>
-          <a:bodyPr>
-            <a:normAutofit fontScale="92500"/>
-          </a:bodyPr>
-          <a:lstStyle/>
+              <a:t>ndb</a:t>
+            </a:r>
+            <a:endParaRPr lang="en-US" dirty="0" smtClean="0"/>
+          </a:p>
           <a:p>
             <a:pPr marL="0" indent="0">
               <a:buNone/>
             </a:pPr>
-            <a:r>
-              <a:rPr lang="en-US" b="1" dirty="0" err="1"/>
-              <a:t>def</a:t>
-            </a:r>
+            <a:endParaRPr lang="en-US" b="1" dirty="0" smtClean="0"/>
+          </a:p>
+          <a:p>
+            <a:pPr marL="0" indent="0">
+              <a:buNone/>
+            </a:pPr>
+            <a:r>
+              <a:rPr lang="en-US" b="1" dirty="0" smtClean="0"/>
+              <a:t>class </a:t>
+            </a:r>
+            <a:r>
+              <a:rPr lang="en-US" dirty="0"/>
+              <a:t>Team(</a:t>
+            </a:r>
+            <a:r>
+              <a:rPr lang="en-US" dirty="0" err="1"/>
+              <a:t>ndb.Model</a:t>
+            </a:r>
+            <a:r>
+              <a:rPr lang="en-US" dirty="0"/>
+              <a:t>):</a:t>
+            </a:r>
+            <a:br>
+              <a:rPr lang="en-US" dirty="0"/>
+            </a:br>
+            <a:r>
+              <a:rPr lang="en-US" dirty="0"/>
+              <a:t>    name = </a:t>
+            </a:r>
+            <a:r>
+              <a:rPr lang="en-US" dirty="0" err="1"/>
+              <a:t>ndb.StringProperty</a:t>
+            </a:r>
+            <a:r>
+              <a:rPr lang="en-US" dirty="0"/>
+              <a:t>()</a:t>
+            </a:r>
+            <a:br>
+              <a:rPr lang="en-US" dirty="0"/>
+            </a:br>
+            <a:r>
+              <a:rPr lang="en-US" dirty="0"/>
+              <a:t>    colors = </a:t>
+            </a:r>
+            <a:r>
+              <a:rPr lang="en-US" dirty="0" err="1"/>
+              <a:t>ndb.StringProperty</a:t>
+            </a:r>
+            <a:r>
+              <a:rPr lang="en-US" dirty="0"/>
+              <a:t>(repeated=True)</a:t>
+            </a:r>
+            <a:br>
+              <a:rPr lang="en-US" dirty="0"/>
+            </a:br>
+            <a:r>
+              <a:rPr lang="en-US" dirty="0"/>
+              <a:t>    mascot = </a:t>
+            </a:r>
+            <a:r>
+              <a:rPr lang="en-US" dirty="0" err="1"/>
+              <a:t>ndb.StringProperty</a:t>
+            </a:r>
+            <a:r>
+              <a:rPr lang="en-US" dirty="0"/>
+              <a:t>()</a:t>
+            </a:r>
+            <a:br>
+              <a:rPr lang="en-US" dirty="0"/>
+            </a:br>
+            <a:r>
+              <a:rPr lang="en-US" dirty="0"/>
+              <a:t/>
+            </a:r>
+            <a:br>
+              <a:rPr lang="en-US" dirty="0"/>
+            </a:br>
             <a:r>
               <a:rPr lang="en-US" b="1" dirty="0"/>
-              <a:t> </a:t>
+              <a:t>class </a:t>
+            </a:r>
+            <a:r>
+              <a:rPr lang="en-US" dirty="0"/>
+              <a:t>Player(</a:t>
             </a:r>
             <a:r>
               <a:rPr lang="en-US" dirty="0" err="1"/>
-              <a:t>team_to_dict</a:t>
-            </a:r>
-            <a:r>
-              <a:rPr lang="en-US" dirty="0"/>
-              <a:t>(team):</a:t>
+              <a:t>ndb.Model</a:t>
+            </a:r>
+            <a:r>
+              <a:rPr lang="en-US" dirty="0"/>
+              <a:t>):</a:t>
             </a:r>
             <a:br>
               <a:rPr lang="en-US" dirty="0"/>
             </a:br>
             <a:r>
               <a:rPr lang="en-US" dirty="0"/>
-              <a:t>    d = </a:t>
+              <a:t>    team = </a:t>
             </a:r>
             <a:r>
               <a:rPr lang="en-US" dirty="0" err="1"/>
-              <a:t>team.to_dict</a:t>
+              <a:t>ndb.KeyProperty</a:t>
             </a:r>
             <a:r>
               <a:rPr lang="en-US" dirty="0"/>
@@ -4395,173 +4679,30 @@
             </a:br>
             <a:r>
               <a:rPr lang="en-US" dirty="0"/>
-              <a:t>    d[</a:t>
-            </a:r>
-            <a:r>
-              <a:rPr lang="en-US" b="1" dirty="0"/>
-              <a:t>'id'</a:t>
-            </a:r>
-            <a:r>
-              <a:rPr lang="en-US" dirty="0"/>
-              <a:t>] = </a:t>
+              <a:t>    name = </a:t>
             </a:r>
             <a:r>
               <a:rPr lang="en-US" dirty="0" err="1"/>
-              <a:t>team.key.id</a:t>
-            </a:r>
-            <a:r>
-              <a:rPr lang="en-US" dirty="0"/>
-              <a:t>() </a:t>
-            </a:r>
-            <a:r>
-              <a:rPr lang="en-US" b="1" dirty="0"/>
-              <a:t>if </a:t>
+              <a:t>ndb.StringProperty</a:t>
+            </a:r>
+            <a:r>
+              <a:rPr lang="en-US" dirty="0"/>
+              <a:t>()</a:t>
+            </a:r>
+            <a:br>
+              <a:rPr lang="en-US" dirty="0"/>
+            </a:br>
+            <a:r>
+              <a:rPr lang="en-US" dirty="0"/>
+              <a:t>    position = </a:t>
             </a:r>
             <a:r>
               <a:rPr lang="en-US" dirty="0" err="1"/>
-              <a:t>team.key</a:t>
-            </a:r>
-            <a:r>
-              <a:rPr lang="en-US" dirty="0"/>
-              <a:t> </a:t>
-            </a:r>
-            <a:r>
-              <a:rPr lang="en-US" b="1" dirty="0"/>
-              <a:t>else </a:t>
-            </a:r>
-            <a:r>
-              <a:rPr lang="en-US" dirty="0"/>
-              <a:t>None</a:t>
-            </a:r>
-            <a:br>
-              <a:rPr lang="en-US" dirty="0"/>
-            </a:br>
-            <a:r>
-              <a:rPr lang="en-US" dirty="0"/>
-              <a:t>    </a:t>
-            </a:r>
-            <a:r>
-              <a:rPr lang="en-US" b="1" dirty="0"/>
-              <a:t>return </a:t>
-            </a:r>
-            <a:r>
-              <a:rPr lang="en-US" dirty="0" smtClean="0"/>
-              <a:t>d</a:t>
-            </a:r>
-            <a:endParaRPr lang="en-US" dirty="0"/>
-          </a:p>
-          <a:p>
-            <a:pPr marL="0" indent="0">
-              <a:buNone/>
-            </a:pPr>
-            <a:r>
-              <a:rPr lang="en-US" dirty="0"/>
-              <a:t># </a:t>
-            </a:r>
-            <a:r>
-              <a:rPr lang="en-US" dirty="0" err="1" smtClean="0"/>
-              <a:t>json.dumps</a:t>
-            </a:r>
-            <a:r>
-              <a:rPr lang="en-US" dirty="0" smtClean="0"/>
-              <a:t>(</a:t>
-            </a:r>
-            <a:r>
-              <a:rPr lang="en-US" dirty="0" err="1" smtClean="0"/>
-              <a:t>team_to_dict</a:t>
-            </a:r>
-            <a:r>
-              <a:rPr lang="en-US" dirty="0" smtClean="0"/>
-              <a:t>(Team</a:t>
-            </a:r>
-            <a:r>
-              <a:rPr lang="en-US" dirty="0"/>
-              <a:t>(</a:t>
-            </a:r>
-            <a:r>
-              <a:rPr lang="en-US" dirty="0"/>
-              <a:t>name</a:t>
-            </a:r>
-            <a:r>
-              <a:rPr lang="en-US" dirty="0"/>
-              <a:t>=</a:t>
-            </a:r>
-            <a:r>
-              <a:rPr lang="en-US" b="1" dirty="0"/>
-              <a:t>"</a:t>
-            </a:r>
-            <a:r>
-              <a:rPr lang="en-US" b="1" dirty="0" smtClean="0"/>
-              <a:t>Minnesota"</a:t>
-            </a:r>
-            <a:r>
-              <a:rPr lang="en-US" dirty="0"/>
-              <a:t>, </a:t>
-            </a:r>
-            <a:r>
-              <a:rPr lang="en-US" dirty="0"/>
-              <a:t>mascot</a:t>
-            </a:r>
-            <a:r>
-              <a:rPr lang="en-US" dirty="0"/>
-              <a:t>=</a:t>
-            </a:r>
-            <a:r>
-              <a:rPr lang="en-US" b="1" dirty="0"/>
-              <a:t>"Gopher"</a:t>
-            </a:r>
-            <a:r>
-              <a:rPr lang="en-US" dirty="0"/>
-              <a:t>, </a:t>
-            </a:r>
-            <a:r>
-              <a:rPr lang="en-US" dirty="0"/>
-              <a:t>colors</a:t>
-            </a:r>
-            <a:r>
-              <a:rPr lang="en-US" dirty="0"/>
-              <a:t>=[</a:t>
-            </a:r>
-            <a:r>
-              <a:rPr lang="en-US" b="1" dirty="0"/>
-              <a:t>"maroon"</a:t>
-            </a:r>
-            <a:r>
-              <a:rPr lang="en-US" dirty="0"/>
-              <a:t>, </a:t>
-            </a:r>
-            <a:r>
-              <a:rPr lang="en-US" b="1" dirty="0"/>
-              <a:t>"gold"</a:t>
-            </a:r>
-            <a:r>
-              <a:rPr lang="en-US" dirty="0"/>
-              <a:t>])</a:t>
-            </a:r>
-            <a:r>
-              <a:rPr lang="en-US" dirty="0" smtClean="0"/>
-              <a:t>))</a:t>
-            </a:r>
-          </a:p>
-          <a:p>
-            <a:pPr marL="0" indent="0">
-              <a:buNone/>
-            </a:pPr>
-            <a:r>
-              <a:rPr lang="en-US" dirty="0" smtClean="0"/>
-              <a:t># =</a:t>
-            </a:r>
-            <a:r>
-              <a:rPr lang="en-US" dirty="0"/>
-              <a:t>&gt; {"id": null, "colors": ["maroon", "gold"], "name": "</a:t>
-            </a:r>
-            <a:r>
-              <a:rPr lang="en-US" dirty="0" smtClean="0"/>
-              <a:t>Minnesota"</a:t>
-            </a:r>
-            <a:r>
-              <a:rPr lang="en-US" dirty="0"/>
-              <a:t>, "mascot": "Gopher"}</a:t>
+              <a:t>ndb.StringProperty</a:t>
+            </a:r>
+            <a:r>
+              <a:rPr lang="en-US" dirty="0"/>
+              <a:t>()</a:t>
             </a:r>
           </a:p>
         </p:txBody>
@@ -4569,7 +4710,7 @@
     </p:spTree>
     <p:extLst>
       <p:ext uri="{BB962C8B-B14F-4D97-AF65-F5344CB8AC3E}">
-        <p14:creationId xmlns:p14="http://schemas.microsoft.com/office/powerpoint/2010/main" val="1187767293"/>
+        <p14:creationId xmlns:p14="http://schemas.microsoft.com/office/powerpoint/2010/main" val="186227706"/>
       </p:ext>
     </p:extLst>
   </p:cSld>
@@ -4613,7 +4754,7 @@
           <a:p>
             <a:r>
               <a:rPr lang="en-US" dirty="0" smtClean="0"/>
-              <a:t>Player: Entity </a:t>
+              <a:t>Team: Entity </a:t>
             </a:r>
             <a:r>
               <a:rPr lang="en-US" dirty="0" smtClean="0">
@@ -4662,7 +4803,7 @@
         <p:spPr/>
         <p:txBody>
           <a:bodyPr>
-            <a:normAutofit fontScale="85000" lnSpcReduction="20000"/>
+            <a:normAutofit fontScale="92500"/>
           </a:bodyPr>
           <a:lstStyle/>
           <a:p>
@@ -4679,11 +4820,69 @@
             </a:r>
             <a:r>
               <a:rPr lang="en-US" dirty="0" err="1"/>
-              <a:t>player_to_dict</a:t>
-            </a:r>
-            <a:r>
-              <a:rPr lang="en-US" dirty="0"/>
-              <a:t>(player):</a:t>
+              <a:t>team_to_dict</a:t>
+            </a:r>
+            <a:r>
+              <a:rPr lang="en-US" dirty="0"/>
+              <a:t>(team):</a:t>
+            </a:r>
+            <a:br>
+              <a:rPr lang="en-US" dirty="0"/>
+            </a:br>
+            <a:r>
+              <a:rPr lang="en-US" dirty="0"/>
+              <a:t>    d = </a:t>
+            </a:r>
+            <a:r>
+              <a:rPr lang="en-US" dirty="0" err="1"/>
+              <a:t>team.to_dict</a:t>
+            </a:r>
+            <a:r>
+              <a:rPr lang="en-US" dirty="0"/>
+              <a:t>()</a:t>
+            </a:r>
+            <a:br>
+              <a:rPr lang="en-US" dirty="0"/>
+            </a:br>
+            <a:r>
+              <a:rPr lang="en-US" dirty="0"/>
+              <a:t>    d[</a:t>
+            </a:r>
+            <a:r>
+              <a:rPr lang="en-US" b="1" dirty="0"/>
+              <a:t>'id'</a:t>
+            </a:r>
+            <a:r>
+              <a:rPr lang="en-US" dirty="0"/>
+              <a:t>] = </a:t>
+            </a:r>
+            <a:r>
+              <a:rPr lang="en-US" dirty="0" err="1"/>
+              <a:t>team.key.id</a:t>
+            </a:r>
+            <a:r>
+              <a:rPr lang="en-US" dirty="0"/>
+              <a:t>() </a:t>
+            </a:r>
+            <a:r>
+              <a:rPr lang="en-US" b="1" dirty="0"/>
+              <a:t>if </a:t>
+            </a:r>
+            <a:r>
+              <a:rPr lang="en-US" dirty="0" err="1"/>
+              <a:t>team.key</a:t>
+            </a:r>
+            <a:r>
+              <a:rPr lang="en-US" dirty="0"/>
+              <a:t> </a:t>
+            </a:r>
+            <a:r>
+              <a:rPr lang="en-US" b="1" dirty="0"/>
+              <a:t>else </a:t>
+            </a:r>
+            <a:r>
+              <a:rPr lang="en-US" dirty="0"/>
+              <a:t>None</a:t>
             </a:r>
             <a:br>
               <a:rPr lang="en-US" dirty="0"/>
@@ -4697,163 +4896,78 @@
               <a:t>return </a:t>
             </a:r>
             <a:r>
-              <a:rPr lang="en-US" dirty="0"/>
-              <a:t>{</a:t>
-            </a:r>
-            <a:br>
-              <a:rPr lang="en-US" dirty="0"/>
-            </a:br>
-            <a:r>
-              <a:rPr lang="en-US" dirty="0"/>
-              <a:t>        </a:t>
+              <a:rPr lang="en-US" dirty="0" smtClean="0"/>
+              <a:t>d</a:t>
+            </a:r>
+            <a:endParaRPr lang="en-US" dirty="0"/>
+          </a:p>
+          <a:p>
+            <a:pPr marL="0" indent="0">
+              <a:buNone/>
+            </a:pPr>
+            <a:r>
+              <a:rPr lang="en-US" dirty="0"/>
+              <a:t># </a:t>
+            </a:r>
+            <a:r>
+              <a:rPr lang="en-US" dirty="0" err="1" smtClean="0"/>
+              <a:t>json.dumps</a:t>
+            </a:r>
+            <a:r>
+              <a:rPr lang="en-US" dirty="0" smtClean="0"/>
+              <a:t>(</a:t>
+            </a:r>
+            <a:r>
+              <a:rPr lang="en-US" dirty="0" err="1" smtClean="0"/>
+              <a:t>team_to_dict</a:t>
+            </a:r>
+            <a:r>
+              <a:rPr lang="en-US" dirty="0" smtClean="0"/>
+              <a:t>(Team</a:t>
+            </a:r>
+            <a:r>
+              <a:rPr lang="en-US" dirty="0"/>
+              <a:t>(name=</a:t>
             </a:r>
             <a:r>
               <a:rPr lang="en-US" b="1" dirty="0"/>
-              <a:t>'id'</a:t>
-            </a:r>
-            <a:r>
-              <a:rPr lang="en-US" dirty="0"/>
-              <a:t>: </a:t>
-            </a:r>
-            <a:r>
-              <a:rPr lang="en-US" dirty="0" err="1"/>
-              <a:t>player.key.id</a:t>
-            </a:r>
-            <a:r>
-              <a:rPr lang="en-US" dirty="0"/>
-              <a:t>() </a:t>
+              <a:t>"</a:t>
+            </a:r>
+            <a:r>
+              <a:rPr lang="en-US" b="1" dirty="0" smtClean="0"/>
+              <a:t>Minnesota"</a:t>
+            </a:r>
+            <a:r>
+              <a:rPr lang="en-US" dirty="0"/>
+              <a:t>, mascot=</a:t>
             </a:r>
             <a:r>
               <a:rPr lang="en-US" b="1" dirty="0"/>
-              <a:t>if </a:t>
-            </a:r>
-            <a:r>
-              <a:rPr lang="en-US" dirty="0" err="1"/>
-              <a:t>player.key</a:t>
-            </a:r>
-            <a:r>
-              <a:rPr lang="en-US" dirty="0"/>
-              <a:t> </a:t>
+              <a:t>"Gopher"</a:t>
+            </a:r>
+            <a:r>
+              <a:rPr lang="en-US" dirty="0"/>
+              <a:t>, colors=[</a:t>
             </a:r>
             <a:r>
               <a:rPr lang="en-US" b="1" dirty="0"/>
-              <a:t>else </a:t>
-            </a:r>
-            <a:r>
-              <a:rPr lang="en-US" dirty="0"/>
-              <a:t>None</a:t>
-            </a:r>
-            <a:r>
-              <a:rPr lang="en-US" dirty="0"/>
-              <a:t>,</a:t>
-            </a:r>
-            <a:br>
-              <a:rPr lang="en-US" dirty="0"/>
-            </a:br>
-            <a:r>
-              <a:rPr lang="en-US" dirty="0"/>
-              <a:t>        </a:t>
+              <a:t>"maroon"</a:t>
+            </a:r>
+            <a:r>
+              <a:rPr lang="en-US" dirty="0"/>
+              <a:t>, </a:t>
             </a:r>
             <a:r>
               <a:rPr lang="en-US" b="1" dirty="0"/>
-              <a:t>'name'</a:t>
-            </a:r>
-            <a:r>
-              <a:rPr lang="en-US" dirty="0"/>
-              <a:t>: </a:t>
-            </a:r>
-            <a:r>
-              <a:rPr lang="en-US" dirty="0" err="1"/>
-              <a:t>player.name</a:t>
-            </a:r>
-            <a:r>
-              <a:rPr lang="en-US" dirty="0"/>
-              <a:t>,</a:t>
-            </a:r>
-            <a:br>
-              <a:rPr lang="en-US" dirty="0"/>
-            </a:br>
-            <a:r>
-              <a:rPr lang="en-US" dirty="0"/>
-              <a:t>        </a:t>
-            </a:r>
-            <a:r>
-              <a:rPr lang="en-US" b="1" dirty="0"/>
-              <a:t>'position'</a:t>
-            </a:r>
-            <a:r>
-              <a:rPr lang="en-US" dirty="0"/>
-              <a:t>: </a:t>
-            </a:r>
-            <a:r>
-              <a:rPr lang="en-US" dirty="0" err="1"/>
-              <a:t>player.position</a:t>
-            </a:r>
-            <a:r>
-              <a:rPr lang="en-US" dirty="0"/>
-              <a:t>,</a:t>
-            </a:r>
-            <a:br>
-              <a:rPr lang="en-US" dirty="0"/>
-            </a:br>
-            <a:r>
-              <a:rPr lang="en-US" dirty="0"/>
-              <a:t>        </a:t>
-            </a:r>
-            <a:r>
-              <a:rPr lang="en-US" b="1" dirty="0"/>
-              <a:t>'</a:t>
-            </a:r>
-            <a:r>
-              <a:rPr lang="en-US" b="1" dirty="0" err="1"/>
-              <a:t>team_id</a:t>
-            </a:r>
-            <a:r>
-              <a:rPr lang="en-US" b="1" dirty="0"/>
-              <a:t>'</a:t>
-            </a:r>
-            <a:r>
-              <a:rPr lang="en-US" dirty="0"/>
-              <a:t>: </a:t>
-            </a:r>
-            <a:r>
-              <a:rPr lang="en-US" dirty="0" err="1"/>
-              <a:t>player.team.id</a:t>
-            </a:r>
-            <a:r>
-              <a:rPr lang="en-US" dirty="0"/>
-              <a:t>() </a:t>
-            </a:r>
-            <a:r>
-              <a:rPr lang="en-US" b="1" dirty="0"/>
-              <a:t>if </a:t>
-            </a:r>
-            <a:r>
-              <a:rPr lang="en-US" dirty="0" err="1"/>
-              <a:t>player.team</a:t>
-            </a:r>
-            <a:r>
-              <a:rPr lang="en-US" dirty="0"/>
-              <a:t> </a:t>
-            </a:r>
-            <a:r>
-              <a:rPr lang="en-US" b="1" dirty="0"/>
-              <a:t>else </a:t>
-            </a:r>
-            <a:r>
-              <a:rPr lang="en-US" dirty="0"/>
-              <a:t>None</a:t>
-            </a:r>
-            <a:br>
-              <a:rPr lang="en-US" dirty="0"/>
-            </a:br>
-            <a:r>
-              <a:rPr lang="en-US" dirty="0"/>
-              <a:t>    </a:t>
-            </a:r>
-            <a:r>
-              <a:rPr lang="en-US" dirty="0" smtClean="0"/>
-              <a:t>}</a:t>
+              <a:t>"gold"</a:t>
+            </a:r>
+            <a:r>
+              <a:rPr lang="en-US" dirty="0"/>
+              <a:t>])</a:t>
+            </a:r>
+            <a:r>
+              <a:rPr lang="en-US" dirty="0" smtClean="0"/>
+              <a:t>))</a:t>
             </a:r>
           </a:p>
           <a:p>
@@ -4861,114 +4975,28 @@
               <a:buNone/>
             </a:pPr>
             <a:r>
-              <a:rPr lang="en-US" dirty="0"/>
-              <a:t># </a:t>
-            </a:r>
-            <a:r>
-              <a:rPr lang="en-US" dirty="0" err="1"/>
-              <a:t>json.dumps</a:t>
-            </a:r>
-            <a:r>
-              <a:rPr lang="en-US" dirty="0"/>
-              <a:t>(</a:t>
-            </a:r>
-            <a:r>
-              <a:rPr lang="en-US" dirty="0" err="1"/>
-              <a:t>main.player_to_dict</a:t>
-            </a:r>
-            <a:r>
-              <a:rPr lang="en-US" dirty="0"/>
-              <a:t>(</a:t>
-            </a:r>
-            <a:r>
-              <a:rPr lang="en-US" dirty="0" err="1"/>
-              <a:t>main.Player</a:t>
-            </a:r>
-            <a:r>
-              <a:rPr lang="en-US" dirty="0"/>
-              <a:t>(</a:t>
-            </a:r>
-            <a:r>
-              <a:rPr lang="en-US" dirty="0"/>
-              <a:t>name</a:t>
-            </a:r>
-            <a:r>
-              <a:rPr lang="en-US" dirty="0"/>
-              <a:t>=</a:t>
-            </a:r>
-            <a:r>
-              <a:rPr lang="en-US" b="1" dirty="0"/>
-              <a:t>"Kyle Rau"</a:t>
-            </a:r>
-            <a:r>
-              <a:rPr lang="en-US" dirty="0"/>
-              <a:t>, </a:t>
-            </a:r>
-            <a:r>
-              <a:rPr lang="en-US" dirty="0"/>
-              <a:t>position</a:t>
-            </a:r>
-            <a:r>
-              <a:rPr lang="en-US" dirty="0"/>
-              <a:t>=</a:t>
-            </a:r>
-            <a:r>
-              <a:rPr lang="en-US" b="1" dirty="0"/>
-              <a:t>"Forward"</a:t>
-            </a:r>
-            <a:r>
-              <a:rPr lang="en-US" dirty="0"/>
-              <a:t>, </a:t>
-            </a:r>
-            <a:r>
-              <a:rPr lang="en-US" dirty="0"/>
-              <a:t>team</a:t>
-            </a:r>
-            <a:r>
-              <a:rPr lang="en-US" dirty="0"/>
-              <a:t>=</a:t>
-            </a:r>
-            <a:r>
-              <a:rPr lang="en-US" dirty="0" err="1"/>
-              <a:t>t.key</a:t>
-            </a:r>
-            <a:r>
-              <a:rPr lang="en-US" dirty="0"/>
-              <a:t>))</a:t>
-            </a:r>
-            <a:r>
-              <a:rPr lang="en-US" dirty="0" smtClean="0"/>
-              <a:t>)</a:t>
-            </a:r>
-          </a:p>
-          <a:p>
-            <a:pPr marL="0" indent="0">
-              <a:buNone/>
-            </a:pPr>
-            <a:r>
               <a:rPr lang="en-US" dirty="0" smtClean="0"/>
               <a:t># =</a:t>
             </a:r>
             <a:r>
               <a:rPr lang="en-US" dirty="0"/>
-              <a:t>&gt; {"position": "Forward", "</a:t>
-            </a:r>
-            <a:r>
-              <a:rPr lang="en-US" dirty="0" err="1"/>
-              <a:t>team_id</a:t>
-            </a:r>
-            <a:r>
-              <a:rPr lang="en-US"/>
-              <a:t>": 1, "id": null, "name": "Kyle Rau"}</a:t>
-            </a:r>
-            <a:endParaRPr lang="en-US" dirty="0"/>
+              <a:t>&gt; {"id": null, "colors": ["maroon", "gold"], "name": "</a:t>
+            </a:r>
+            <a:r>
+              <a:rPr lang="en-US" dirty="0" smtClean="0"/>
+              <a:t>Minnesota"</a:t>
+            </a:r>
+            <a:r>
+              <a:rPr lang="en-US" dirty="0"/>
+              <a:t>, "mascot": "Gopher"}</a:t>
+            </a:r>
           </a:p>
         </p:txBody>
       </p:sp>
     </p:spTree>
     <p:extLst>
       <p:ext uri="{BB962C8B-B14F-4D97-AF65-F5344CB8AC3E}">
-        <p14:creationId xmlns:p14="http://schemas.microsoft.com/office/powerpoint/2010/main" val="3077875695"/>
+        <p14:creationId xmlns:p14="http://schemas.microsoft.com/office/powerpoint/2010/main" val="1187767293"/>
       </p:ext>
     </p:extLst>
   </p:cSld>

</xml_diff>